<commit_message>
session 2 pptx final
</commit_message>
<xml_diff>
--- a/191121 - JOIN Conference @Warsaw/Session 2/Working with Azure Database Services Platform.pptx
+++ b/191121 - JOIN Conference @Warsaw/Session 2/Working with Azure Database Services Platform.pptx
@@ -28,9 +28,11 @@
     <p:sldId id="289" r:id="rId22"/>
     <p:sldId id="290" r:id="rId23"/>
     <p:sldId id="291" r:id="rId24"/>
-    <p:sldId id="292" r:id="rId25"/>
-    <p:sldId id="293" r:id="rId26"/>
-    <p:sldId id="263" r:id="rId27"/>
+    <p:sldId id="294" r:id="rId25"/>
+    <p:sldId id="295" r:id="rId26"/>
+    <p:sldId id="292" r:id="rId27"/>
+    <p:sldId id="293" r:id="rId28"/>
+    <p:sldId id="263" r:id="rId29"/>
   </p:sldIdLst>
   <p:sldSz cx="9144000" cy="5143500" type="screen16x9"/>
   <p:notesSz cx="6858000" cy="9144000"/>
@@ -610,7 +612,7 @@
           <a:p>
             <a:fld id="{30EF2D44-A5CD-463A-8B81-06014B7980E5}" type="datetimeFigureOut">
               <a:rPr lang="pl-PL" smtClean="0"/>
-              <a:t>18.11.2019</a:t>
+              <a:t>20.11.2019</a:t>
             </a:fld>
             <a:endParaRPr lang="pl-PL"/>
           </a:p>
@@ -767,7 +769,7 @@
             <a:fld id="{30EF2D44-A5CD-463A-8B81-06014B7980E5}" type="datetimeFigureOut">
               <a:rPr lang="pl-PL" smtClean="0"/>
               <a:pPr/>
-              <a:t>18.11.2019</a:t>
+              <a:t>20.11.2019</a:t>
             </a:fld>
             <a:endParaRPr lang="pl-PL"/>
           </a:p>
@@ -1251,7 +1253,7 @@
           <a:p>
             <a:fld id="{30EF2D44-A5CD-463A-8B81-06014B7980E5}" type="datetimeFigureOut">
               <a:rPr lang="pl-PL" smtClean="0"/>
-              <a:t>18.11.2019</a:t>
+              <a:t>20.11.2019</a:t>
             </a:fld>
             <a:endParaRPr lang="pl-PL"/>
           </a:p>
@@ -1408,7 +1410,7 @@
             <a:fld id="{30EF2D44-A5CD-463A-8B81-06014B7980E5}" type="datetimeFigureOut">
               <a:rPr lang="pl-PL" smtClean="0"/>
               <a:pPr/>
-              <a:t>18.11.2019</a:t>
+              <a:t>20.11.2019</a:t>
             </a:fld>
             <a:endParaRPr lang="pl-PL"/>
           </a:p>
@@ -1887,7 +1889,7 @@
           <a:p>
             <a:fld id="{30EF2D44-A5CD-463A-8B81-06014B7980E5}" type="datetimeFigureOut">
               <a:rPr lang="pl-PL" smtClean="0"/>
-              <a:t>18.11.2019</a:t>
+              <a:t>20.11.2019</a:t>
             </a:fld>
             <a:endParaRPr lang="pl-PL"/>
           </a:p>
@@ -2044,7 +2046,7 @@
             <a:fld id="{30EF2D44-A5CD-463A-8B81-06014B7980E5}" type="datetimeFigureOut">
               <a:rPr lang="pl-PL" smtClean="0"/>
               <a:pPr/>
-              <a:t>18.11.2019</a:t>
+              <a:t>20.11.2019</a:t>
             </a:fld>
             <a:endParaRPr lang="pl-PL"/>
           </a:p>
@@ -2608,7 +2610,7 @@
           <a:p>
             <a:fld id="{30EF2D44-A5CD-463A-8B81-06014B7980E5}" type="datetimeFigureOut">
               <a:rPr lang="pl-PL" smtClean="0"/>
-              <a:t>18.11.2019</a:t>
+              <a:t>20.11.2019</a:t>
             </a:fld>
             <a:endParaRPr lang="pl-PL"/>
           </a:p>
@@ -2765,7 +2767,7 @@
             <a:fld id="{30EF2D44-A5CD-463A-8B81-06014B7980E5}" type="datetimeFigureOut">
               <a:rPr lang="pl-PL" smtClean="0"/>
               <a:pPr/>
-              <a:t>18.11.2019</a:t>
+              <a:t>20.11.2019</a:t>
             </a:fld>
             <a:endParaRPr lang="pl-PL"/>
           </a:p>
@@ -3360,7 +3362,7 @@
           <a:p>
             <a:fld id="{30EF2D44-A5CD-463A-8B81-06014B7980E5}" type="datetimeFigureOut">
               <a:rPr lang="pl-PL" smtClean="0"/>
-              <a:t>18.11.2019</a:t>
+              <a:t>20.11.2019</a:t>
             </a:fld>
             <a:endParaRPr lang="pl-PL"/>
           </a:p>
@@ -3517,7 +3519,7 @@
             <a:fld id="{30EF2D44-A5CD-463A-8B81-06014B7980E5}" type="datetimeFigureOut">
               <a:rPr lang="pl-PL" smtClean="0"/>
               <a:pPr/>
-              <a:t>18.11.2019</a:t>
+              <a:t>20.11.2019</a:t>
             </a:fld>
             <a:endParaRPr lang="pl-PL"/>
           </a:p>
@@ -4242,7 +4244,7 @@
           <a:p>
             <a:fld id="{30EF2D44-A5CD-463A-8B81-06014B7980E5}" type="datetimeFigureOut">
               <a:rPr lang="pl-PL" smtClean="0"/>
-              <a:t>18.11.2019</a:t>
+              <a:t>20.11.2019</a:t>
             </a:fld>
             <a:endParaRPr lang="pl-PL"/>
           </a:p>
@@ -4399,7 +4401,7 @@
             <a:fld id="{30EF2D44-A5CD-463A-8B81-06014B7980E5}" type="datetimeFigureOut">
               <a:rPr lang="pl-PL" smtClean="0"/>
               <a:pPr/>
-              <a:t>18.11.2019</a:t>
+              <a:t>20.11.2019</a:t>
             </a:fld>
             <a:endParaRPr lang="pl-PL"/>
           </a:p>
@@ -4822,7 +4824,7 @@
           <a:p>
             <a:fld id="{30EF2D44-A5CD-463A-8B81-06014B7980E5}" type="datetimeFigureOut">
               <a:rPr lang="pl-PL" smtClean="0"/>
-              <a:t>18.11.2019</a:t>
+              <a:t>20.11.2019</a:t>
             </a:fld>
             <a:endParaRPr lang="pl-PL"/>
           </a:p>
@@ -4979,7 +4981,7 @@
             <a:fld id="{30EF2D44-A5CD-463A-8B81-06014B7980E5}" type="datetimeFigureOut">
               <a:rPr lang="pl-PL" smtClean="0"/>
               <a:pPr/>
-              <a:t>18.11.2019</a:t>
+              <a:t>20.11.2019</a:t>
             </a:fld>
             <a:endParaRPr lang="pl-PL"/>
           </a:p>
@@ -5380,7 +5382,7 @@
           <a:p>
             <a:fld id="{30EF2D44-A5CD-463A-8B81-06014B7980E5}" type="datetimeFigureOut">
               <a:rPr lang="pl-PL" smtClean="0"/>
-              <a:t>18.11.2019</a:t>
+              <a:t>20.11.2019</a:t>
             </a:fld>
             <a:endParaRPr lang="pl-PL"/>
           </a:p>
@@ -5537,7 +5539,7 @@
             <a:fld id="{30EF2D44-A5CD-463A-8B81-06014B7980E5}" type="datetimeFigureOut">
               <a:rPr lang="pl-PL" smtClean="0"/>
               <a:pPr/>
-              <a:t>18.11.2019</a:t>
+              <a:t>20.11.2019</a:t>
             </a:fld>
             <a:endParaRPr lang="pl-PL"/>
           </a:p>
@@ -6118,7 +6120,7 @@
           <a:p>
             <a:fld id="{30EF2D44-A5CD-463A-8B81-06014B7980E5}" type="datetimeFigureOut">
               <a:rPr lang="pl-PL" smtClean="0"/>
-              <a:t>18.11.2019</a:t>
+              <a:t>20.11.2019</a:t>
             </a:fld>
             <a:endParaRPr lang="pl-PL"/>
           </a:p>
@@ -6275,7 +6277,7 @@
             <a:fld id="{30EF2D44-A5CD-463A-8B81-06014B7980E5}" type="datetimeFigureOut">
               <a:rPr lang="pl-PL" smtClean="0"/>
               <a:pPr/>
-              <a:t>18.11.2019</a:t>
+              <a:t>20.11.2019</a:t>
             </a:fld>
             <a:endParaRPr lang="pl-PL"/>
           </a:p>
@@ -6833,7 +6835,7 @@
           <a:p>
             <a:fld id="{30EF2D44-A5CD-463A-8B81-06014B7980E5}" type="datetimeFigureOut">
               <a:rPr lang="pl-PL" smtClean="0"/>
-              <a:t>18.11.2019</a:t>
+              <a:t>20.11.2019</a:t>
             </a:fld>
             <a:endParaRPr lang="pl-PL"/>
           </a:p>
@@ -6990,7 +6992,7 @@
             <a:fld id="{30EF2D44-A5CD-463A-8B81-06014B7980E5}" type="datetimeFigureOut">
               <a:rPr lang="pl-PL" smtClean="0"/>
               <a:pPr/>
-              <a:t>18.11.2019</a:t>
+              <a:t>20.11.2019</a:t>
             </a:fld>
             <a:endParaRPr lang="pl-PL"/>
           </a:p>
@@ -9471,7 +9473,7 @@
           <p:cNvPr id="2" name="Title 1">
             <a:extLst>
               <a:ext uri="{FF2B5EF4-FFF2-40B4-BE49-F238E27FC236}">
-                <a16:creationId xmlns:a16="http://schemas.microsoft.com/office/drawing/2014/main" id="{35ADEABA-C71A-4068-957F-436D34BE6D4D}"/>
+                <a16:creationId xmlns:a16="http://schemas.microsoft.com/office/drawing/2014/main" id="{D8BA7788-5941-4848-946F-37266793A3DE}"/>
               </a:ext>
             </a:extLst>
           </p:cNvPr>
@@ -9491,7 +9493,7 @@
           <a:p>
             <a:r>
               <a:rPr lang="it-IT" dirty="0"/>
-              <a:t>Takeaways</a:t>
+              <a:t>Automation</a:t>
             </a:r>
             <a:endParaRPr lang="en-US" dirty="0"/>
           </a:p>
@@ -9502,7 +9504,7 @@
           <p:cNvPr id="3" name="Content Placeholder 2">
             <a:extLst>
               <a:ext uri="{FF2B5EF4-FFF2-40B4-BE49-F238E27FC236}">
-                <a16:creationId xmlns:a16="http://schemas.microsoft.com/office/drawing/2014/main" id="{59A2C5DA-AE69-47EF-BC35-0946B9E7C1FB}"/>
+                <a16:creationId xmlns:a16="http://schemas.microsoft.com/office/drawing/2014/main" id="{D42D1513-BFFB-4755-B34C-5BE061318D0B}"/>
               </a:ext>
             </a:extLst>
           </p:cNvPr>
@@ -9520,51 +9522,63 @@
           <a:p>
             <a:r>
               <a:rPr lang="it-IT" dirty="0"/>
-              <a:t>Reduced effort in governance</a:t>
+              <a:t>Use Automation (Powershell-as-a-Service)</a:t>
             </a:r>
           </a:p>
           <a:p>
             <a:r>
               <a:rPr lang="it-IT" dirty="0"/>
-              <a:t>Many deployment and consolidation options</a:t>
-            </a:r>
-          </a:p>
-          <a:p>
-            <a:r>
-              <a:rPr lang="it-IT" dirty="0"/>
-              <a:t>Several pricing tiers</a:t>
-            </a:r>
-          </a:p>
-          <a:p>
-            <a:r>
-              <a:rPr lang="it-IT" dirty="0"/>
-              <a:t>Many of the SQL Server features (preview ones!)</a:t>
-            </a:r>
-          </a:p>
-          <a:p>
-            <a:r>
-              <a:rPr lang="it-IT" dirty="0"/>
-              <a:t>Intelligent features (like auto-tuning)</a:t>
-            </a:r>
-          </a:p>
-          <a:p>
-            <a:r>
-              <a:rPr lang="it-IT" dirty="0"/>
-              <a:t>Designed for HA/HR (geo-replication, failover groups)</a:t>
-            </a:r>
-          </a:p>
-          <a:p>
-            <a:r>
-              <a:rPr lang="it-IT" dirty="0"/>
-              <a:t>No backup hassle</a:t>
-            </a:r>
-          </a:p>
-        </p:txBody>
-      </p:sp>
+              <a:t>Organize tools in Runbooks</a:t>
+            </a:r>
+          </a:p>
+          <a:p>
+            <a:r>
+              <a:rPr lang="en-US" dirty="0"/>
+              <a:t>Centralize variables and secrets</a:t>
+            </a:r>
+          </a:p>
+          <a:p>
+            <a:r>
+              <a:rPr lang="en-US" dirty="0"/>
+              <a:t>Capture logs</a:t>
+            </a:r>
+          </a:p>
+        </p:txBody>
+      </p:sp>
+      <p:pic>
+        <p:nvPicPr>
+          <p:cNvPr id="5" name="Picture 4">
+            <a:extLst>
+              <a:ext uri="{FF2B5EF4-FFF2-40B4-BE49-F238E27FC236}">
+                <a16:creationId xmlns:a16="http://schemas.microsoft.com/office/drawing/2014/main" id="{023EDF44-1B02-4272-928E-5E9081C22181}"/>
+              </a:ext>
+            </a:extLst>
+          </p:cNvPr>
+          <p:cNvPicPr>
+            <a:picLocks noChangeAspect="1"/>
+          </p:cNvPicPr>
+          <p:nvPr/>
+        </p:nvPicPr>
+        <p:blipFill>
+          <a:blip r:embed="rId2"/>
+          <a:stretch>
+            <a:fillRect/>
+          </a:stretch>
+        </p:blipFill>
+        <p:spPr>
+          <a:xfrm>
+            <a:off x="3203848" y="2139702"/>
+            <a:ext cx="5436096" cy="2456884"/>
+          </a:xfrm>
+          <a:prstGeom prst="rect">
+            <a:avLst/>
+          </a:prstGeom>
+        </p:spPr>
+      </p:pic>
     </p:spTree>
     <p:extLst>
       <p:ext uri="{BB962C8B-B14F-4D97-AF65-F5344CB8AC3E}">
-        <p14:creationId xmlns:p14="http://schemas.microsoft.com/office/powerpoint/2010/main" val="4217211558"/>
+        <p14:creationId xmlns:p14="http://schemas.microsoft.com/office/powerpoint/2010/main" val="1187206760"/>
       </p:ext>
     </p:extLst>
   </p:cSld>
@@ -9593,6 +9607,219 @@
       </p:grpSpPr>
       <p:sp>
         <p:nvSpPr>
+          <p:cNvPr id="2" name="Title 1">
+            <a:extLst>
+              <a:ext uri="{FF2B5EF4-FFF2-40B4-BE49-F238E27FC236}">
+                <a16:creationId xmlns:a16="http://schemas.microsoft.com/office/drawing/2014/main" id="{84C47989-05E9-40B8-A918-C450F35AF2FF}"/>
+              </a:ext>
+            </a:extLst>
+          </p:cNvPr>
+          <p:cNvSpPr>
+            <a:spLocks noGrp="1"/>
+          </p:cNvSpPr>
+          <p:nvPr>
+            <p:ph type="title"/>
+          </p:nvPr>
+        </p:nvSpPr>
+        <p:spPr/>
+        <p:txBody>
+          <a:bodyPr/>
+          <a:lstStyle/>
+          <a:p>
+            <a:r>
+              <a:rPr lang="it-IT" dirty="0"/>
+              <a:t>DEMO</a:t>
+            </a:r>
+            <a:endParaRPr lang="en-US" dirty="0"/>
+          </a:p>
+        </p:txBody>
+      </p:sp>
+      <p:sp>
+        <p:nvSpPr>
+          <p:cNvPr id="3" name="Text Placeholder 2">
+            <a:extLst>
+              <a:ext uri="{FF2B5EF4-FFF2-40B4-BE49-F238E27FC236}">
+                <a16:creationId xmlns:a16="http://schemas.microsoft.com/office/drawing/2014/main" id="{84D04D2C-3EDE-4BBD-A730-1C89E6244FD6}"/>
+              </a:ext>
+            </a:extLst>
+          </p:cNvPr>
+          <p:cNvSpPr>
+            <a:spLocks noGrp="1"/>
+          </p:cNvSpPr>
+          <p:nvPr>
+            <p:ph type="body" idx="1"/>
+          </p:nvPr>
+        </p:nvSpPr>
+        <p:spPr/>
+        <p:txBody>
+          <a:bodyPr/>
+          <a:lstStyle/>
+          <a:p>
+            <a:r>
+              <a:rPr lang="it-IT"/>
+              <a:t>Automation</a:t>
+            </a:r>
+            <a:endParaRPr lang="en-US" dirty="0"/>
+          </a:p>
+        </p:txBody>
+      </p:sp>
+    </p:spTree>
+    <p:extLst>
+      <p:ext uri="{BB962C8B-B14F-4D97-AF65-F5344CB8AC3E}">
+        <p14:creationId xmlns:p14="http://schemas.microsoft.com/office/powerpoint/2010/main" val="2890745072"/>
+      </p:ext>
+    </p:extLst>
+  </p:cSld>
+  <p:clrMapOvr>
+    <a:masterClrMapping/>
+  </p:clrMapOvr>
+</p:sld>
+</file>
+
+<file path=ppt/slides/slide26.xml><?xml version="1.0" encoding="utf-8"?>
+<p:sld xmlns:a="http://schemas.openxmlformats.org/drawingml/2006/main" xmlns:r="http://schemas.openxmlformats.org/officeDocument/2006/relationships" xmlns:p="http://schemas.openxmlformats.org/presentationml/2006/main">
+  <p:cSld>
+    <p:spTree>
+      <p:nvGrpSpPr>
+        <p:cNvPr id="1" name=""/>
+        <p:cNvGrpSpPr/>
+        <p:nvPr/>
+      </p:nvGrpSpPr>
+      <p:grpSpPr>
+        <a:xfrm>
+          <a:off x="0" y="0"/>
+          <a:ext cx="0" cy="0"/>
+          <a:chOff x="0" y="0"/>
+          <a:chExt cx="0" cy="0"/>
+        </a:xfrm>
+      </p:grpSpPr>
+      <p:sp>
+        <p:nvSpPr>
+          <p:cNvPr id="2" name="Title 1">
+            <a:extLst>
+              <a:ext uri="{FF2B5EF4-FFF2-40B4-BE49-F238E27FC236}">
+                <a16:creationId xmlns:a16="http://schemas.microsoft.com/office/drawing/2014/main" id="{35ADEABA-C71A-4068-957F-436D34BE6D4D}"/>
+              </a:ext>
+            </a:extLst>
+          </p:cNvPr>
+          <p:cNvSpPr>
+            <a:spLocks noGrp="1"/>
+          </p:cNvSpPr>
+          <p:nvPr>
+            <p:ph type="title"/>
+          </p:nvPr>
+        </p:nvSpPr>
+        <p:spPr/>
+        <p:txBody>
+          <a:bodyPr>
+            <a:normAutofit fontScale="90000"/>
+          </a:bodyPr>
+          <a:lstStyle/>
+          <a:p>
+            <a:r>
+              <a:rPr lang="it-IT" dirty="0"/>
+              <a:t>Takeaways</a:t>
+            </a:r>
+            <a:endParaRPr lang="en-US" dirty="0"/>
+          </a:p>
+        </p:txBody>
+      </p:sp>
+      <p:sp>
+        <p:nvSpPr>
+          <p:cNvPr id="3" name="Content Placeholder 2">
+            <a:extLst>
+              <a:ext uri="{FF2B5EF4-FFF2-40B4-BE49-F238E27FC236}">
+                <a16:creationId xmlns:a16="http://schemas.microsoft.com/office/drawing/2014/main" id="{59A2C5DA-AE69-47EF-BC35-0946B9E7C1FB}"/>
+              </a:ext>
+            </a:extLst>
+          </p:cNvPr>
+          <p:cNvSpPr>
+            <a:spLocks noGrp="1"/>
+          </p:cNvSpPr>
+          <p:nvPr>
+            <p:ph idx="1"/>
+          </p:nvPr>
+        </p:nvSpPr>
+        <p:spPr/>
+        <p:txBody>
+          <a:bodyPr/>
+          <a:lstStyle/>
+          <a:p>
+            <a:r>
+              <a:rPr lang="it-IT" dirty="0"/>
+              <a:t>Reduced effort in governance</a:t>
+            </a:r>
+          </a:p>
+          <a:p>
+            <a:r>
+              <a:rPr lang="it-IT" dirty="0"/>
+              <a:t>Many deployment and consolidation options</a:t>
+            </a:r>
+          </a:p>
+          <a:p>
+            <a:r>
+              <a:rPr lang="it-IT" dirty="0"/>
+              <a:t>Several pricing tiers</a:t>
+            </a:r>
+          </a:p>
+          <a:p>
+            <a:r>
+              <a:rPr lang="it-IT" dirty="0"/>
+              <a:t>Many of the SQL Server features (preview ones!)</a:t>
+            </a:r>
+          </a:p>
+          <a:p>
+            <a:r>
+              <a:rPr lang="it-IT" dirty="0"/>
+              <a:t>Intelligent features (like auto-tuning)</a:t>
+            </a:r>
+          </a:p>
+          <a:p>
+            <a:r>
+              <a:rPr lang="it-IT" dirty="0"/>
+              <a:t>Designed for HA/HR (geo-replication, failover groups)</a:t>
+            </a:r>
+          </a:p>
+          <a:p>
+            <a:r>
+              <a:rPr lang="it-IT" dirty="0"/>
+              <a:t>No backup hassle</a:t>
+            </a:r>
+          </a:p>
+        </p:txBody>
+      </p:sp>
+    </p:spTree>
+    <p:extLst>
+      <p:ext uri="{BB962C8B-B14F-4D97-AF65-F5344CB8AC3E}">
+        <p14:creationId xmlns:p14="http://schemas.microsoft.com/office/powerpoint/2010/main" val="4217211558"/>
+      </p:ext>
+    </p:extLst>
+  </p:cSld>
+  <p:clrMapOvr>
+    <a:masterClrMapping/>
+  </p:clrMapOvr>
+</p:sld>
+</file>
+
+<file path=ppt/slides/slide27.xml><?xml version="1.0" encoding="utf-8"?>
+<p:sld xmlns:a="http://schemas.openxmlformats.org/drawingml/2006/main" xmlns:r="http://schemas.openxmlformats.org/officeDocument/2006/relationships" xmlns:p="http://schemas.openxmlformats.org/presentationml/2006/main">
+  <p:cSld>
+    <p:spTree>
+      <p:nvGrpSpPr>
+        <p:cNvPr id="1" name=""/>
+        <p:cNvGrpSpPr/>
+        <p:nvPr/>
+      </p:nvGrpSpPr>
+      <p:grpSpPr>
+        <a:xfrm>
+          <a:off x="0" y="0"/>
+          <a:ext cx="0" cy="0"/>
+          <a:chOff x="0" y="0"/>
+          <a:chExt cx="0" cy="0"/>
+        </a:xfrm>
+      </p:grpSpPr>
+      <p:sp>
+        <p:nvSpPr>
           <p:cNvPr id="2" name="Tytuł 1"/>
           <p:cNvSpPr>
             <a:spLocks noGrp="1"/>
@@ -9665,7 +9892,7 @@
 </p:sld>
 </file>
 
-<file path=ppt/slides/slide26.xml><?xml version="1.0" encoding="utf-8"?>
+<file path=ppt/slides/slide28.xml><?xml version="1.0" encoding="utf-8"?>
 <p:sld xmlns:a="http://schemas.openxmlformats.org/drawingml/2006/main" xmlns:r="http://schemas.openxmlformats.org/officeDocument/2006/relationships" xmlns:p="http://schemas.openxmlformats.org/presentationml/2006/main">
   <p:cSld>
     <p:bg>

</xml_diff>